<commit_message>
Commit - Add Images
</commit_message>
<xml_diff>
--- a/Eficiencia_Energetica_v1.pptx
+++ b/Eficiencia_Energetica_v1.pptx
@@ -176,7 +176,7 @@
             </a:lvl1pPr>
           </a:lstStyle>
           <a:p>
-            <a:endParaRPr lang="es-ES"/>
+            <a:endParaRPr lang="es-ES" dirty="0"/>
           </a:p>
         </p:txBody>
       </p:sp>
@@ -209,9 +209,9 @@
           <a:p>
             <a:fld id="{146FFF57-B40B-4E21-868C-3AF6A7E9BB49}" type="datetimeFigureOut">
               <a:rPr lang="es-ES" smtClean="0"/>
-              <a:t>06/05/2025</a:t>
+              <a:t>13/06/2025</a:t>
             </a:fld>
-            <a:endParaRPr lang="es-ES"/>
+            <a:endParaRPr lang="es-ES" dirty="0"/>
           </a:p>
         </p:txBody>
       </p:sp>
@@ -244,7 +244,7 @@
           <a:bodyPr vert="horz" lIns="91440" tIns="45720" rIns="91440" bIns="45720" rtlCol="0" anchor="ctr"/>
           <a:lstStyle/>
           <a:p>
-            <a:endParaRPr lang="es-ES"/>
+            <a:endParaRPr lang="es-ES" dirty="0"/>
           </a:p>
         </p:txBody>
       </p:sp>
@@ -334,7 +334,7 @@
             </a:lvl1pPr>
           </a:lstStyle>
           <a:p>
-            <a:endParaRPr lang="es-ES"/>
+            <a:endParaRPr lang="es-ES" dirty="0"/>
           </a:p>
         </p:txBody>
       </p:sp>
@@ -369,7 +369,7 @@
               <a:rPr lang="es-ES" smtClean="0"/>
               <a:t>‹Nº›</a:t>
             </a:fld>
-            <a:endParaRPr lang="es-ES"/>
+            <a:endParaRPr lang="es-ES" dirty="0"/>
           </a:p>
         </p:txBody>
       </p:sp>
@@ -476,6 +476,846 @@
 </p:notesMaster>
 </file>
 
+<file path=ppt/notesSlides/notesSlide1.xml><?xml version="1.0" encoding="utf-8"?>
+<p:notes xmlns:a="http://schemas.openxmlformats.org/drawingml/2006/main" xmlns:r="http://schemas.openxmlformats.org/officeDocument/2006/relationships" xmlns:p="http://schemas.openxmlformats.org/presentationml/2006/main">
+  <p:cSld>
+    <p:spTree>
+      <p:nvGrpSpPr>
+        <p:cNvPr id="1" name=""/>
+        <p:cNvGrpSpPr/>
+        <p:nvPr/>
+      </p:nvGrpSpPr>
+      <p:grpSpPr>
+        <a:xfrm>
+          <a:off x="0" y="0"/>
+          <a:ext cx="0" cy="0"/>
+          <a:chOff x="0" y="0"/>
+          <a:chExt cx="0" cy="0"/>
+        </a:xfrm>
+      </p:grpSpPr>
+      <p:sp>
+        <p:nvSpPr>
+          <p:cNvPr id="2" name="Marcador de imagen de diapositiva 1"/>
+          <p:cNvSpPr>
+            <a:spLocks noGrp="1" noRot="1" noChangeAspect="1"/>
+          </p:cNvSpPr>
+          <p:nvPr>
+            <p:ph type="sldImg"/>
+          </p:nvPr>
+        </p:nvSpPr>
+        <p:spPr/>
+      </p:sp>
+      <p:sp>
+        <p:nvSpPr>
+          <p:cNvPr id="3" name="Marcador de notas 2"/>
+          <p:cNvSpPr>
+            <a:spLocks noGrp="1"/>
+          </p:cNvSpPr>
+          <p:nvPr>
+            <p:ph type="body" idx="1"/>
+          </p:nvPr>
+        </p:nvSpPr>
+        <p:spPr/>
+        <p:txBody>
+          <a:bodyPr/>
+          <a:lstStyle/>
+          <a:p>
+            <a:endParaRPr lang="es-ES" dirty="0"/>
+          </a:p>
+        </p:txBody>
+      </p:sp>
+      <p:sp>
+        <p:nvSpPr>
+          <p:cNvPr id="4" name="Marcador de número de diapositiva 3"/>
+          <p:cNvSpPr>
+            <a:spLocks noGrp="1"/>
+          </p:cNvSpPr>
+          <p:nvPr>
+            <p:ph type="sldNum" sz="quarter" idx="5"/>
+          </p:nvPr>
+        </p:nvSpPr>
+        <p:spPr/>
+        <p:txBody>
+          <a:bodyPr/>
+          <a:lstStyle/>
+          <a:p>
+            <a:fld id="{8B9AE26B-B888-4119-B89A-CB927C77B7F8}" type="slidenum">
+              <a:rPr lang="es-ES" smtClean="0"/>
+              <a:t>1</a:t>
+            </a:fld>
+            <a:endParaRPr lang="es-ES" dirty="0"/>
+          </a:p>
+        </p:txBody>
+      </p:sp>
+    </p:spTree>
+    <p:extLst>
+      <p:ext uri="{BB962C8B-B14F-4D97-AF65-F5344CB8AC3E}">
+        <p14:creationId xmlns:p14="http://schemas.microsoft.com/office/powerpoint/2010/main" val="2229321366"/>
+      </p:ext>
+    </p:extLst>
+  </p:cSld>
+  <p:clrMapOvr>
+    <a:masterClrMapping/>
+  </p:clrMapOvr>
+</p:notes>
+</file>
+
+<file path=ppt/notesSlides/notesSlide10.xml><?xml version="1.0" encoding="utf-8"?>
+<p:notes xmlns:a="http://schemas.openxmlformats.org/drawingml/2006/main" xmlns:r="http://schemas.openxmlformats.org/officeDocument/2006/relationships" xmlns:p="http://schemas.openxmlformats.org/presentationml/2006/main">
+  <p:cSld>
+    <p:spTree>
+      <p:nvGrpSpPr>
+        <p:cNvPr id="1" name=""/>
+        <p:cNvGrpSpPr/>
+        <p:nvPr/>
+      </p:nvGrpSpPr>
+      <p:grpSpPr>
+        <a:xfrm>
+          <a:off x="0" y="0"/>
+          <a:ext cx="0" cy="0"/>
+          <a:chOff x="0" y="0"/>
+          <a:chExt cx="0" cy="0"/>
+        </a:xfrm>
+      </p:grpSpPr>
+      <p:sp>
+        <p:nvSpPr>
+          <p:cNvPr id="2" name="Marcador de imagen de diapositiva 1"/>
+          <p:cNvSpPr>
+            <a:spLocks noGrp="1" noRot="1" noChangeAspect="1"/>
+          </p:cNvSpPr>
+          <p:nvPr>
+            <p:ph type="sldImg"/>
+          </p:nvPr>
+        </p:nvSpPr>
+        <p:spPr/>
+      </p:sp>
+      <p:sp>
+        <p:nvSpPr>
+          <p:cNvPr id="3" name="Marcador de notas 2"/>
+          <p:cNvSpPr>
+            <a:spLocks noGrp="1"/>
+          </p:cNvSpPr>
+          <p:nvPr>
+            <p:ph type="body" idx="1"/>
+          </p:nvPr>
+        </p:nvSpPr>
+        <p:spPr/>
+        <p:txBody>
+          <a:bodyPr/>
+          <a:lstStyle/>
+          <a:p>
+            <a:endParaRPr lang="es-ES" dirty="0"/>
+          </a:p>
+        </p:txBody>
+      </p:sp>
+      <p:sp>
+        <p:nvSpPr>
+          <p:cNvPr id="4" name="Marcador de número de diapositiva 3"/>
+          <p:cNvSpPr>
+            <a:spLocks noGrp="1"/>
+          </p:cNvSpPr>
+          <p:nvPr>
+            <p:ph type="sldNum" sz="quarter" idx="5"/>
+          </p:nvPr>
+        </p:nvSpPr>
+        <p:spPr/>
+        <p:txBody>
+          <a:bodyPr/>
+          <a:lstStyle/>
+          <a:p>
+            <a:fld id="{8B9AE26B-B888-4119-B89A-CB927C77B7F8}" type="slidenum">
+              <a:rPr lang="es-ES" smtClean="0"/>
+              <a:t>10</a:t>
+            </a:fld>
+            <a:endParaRPr lang="es-ES" dirty="0"/>
+          </a:p>
+        </p:txBody>
+      </p:sp>
+    </p:spTree>
+    <p:extLst>
+      <p:ext uri="{BB962C8B-B14F-4D97-AF65-F5344CB8AC3E}">
+        <p14:creationId xmlns:p14="http://schemas.microsoft.com/office/powerpoint/2010/main" val="1512715669"/>
+      </p:ext>
+    </p:extLst>
+  </p:cSld>
+  <p:clrMapOvr>
+    <a:masterClrMapping/>
+  </p:clrMapOvr>
+</p:notes>
+</file>
+
+<file path=ppt/notesSlides/notesSlide2.xml><?xml version="1.0" encoding="utf-8"?>
+<p:notes xmlns:a="http://schemas.openxmlformats.org/drawingml/2006/main" xmlns:r="http://schemas.openxmlformats.org/officeDocument/2006/relationships" xmlns:p="http://schemas.openxmlformats.org/presentationml/2006/main">
+  <p:cSld>
+    <p:spTree>
+      <p:nvGrpSpPr>
+        <p:cNvPr id="1" name=""/>
+        <p:cNvGrpSpPr/>
+        <p:nvPr/>
+      </p:nvGrpSpPr>
+      <p:grpSpPr>
+        <a:xfrm>
+          <a:off x="0" y="0"/>
+          <a:ext cx="0" cy="0"/>
+          <a:chOff x="0" y="0"/>
+          <a:chExt cx="0" cy="0"/>
+        </a:xfrm>
+      </p:grpSpPr>
+      <p:sp>
+        <p:nvSpPr>
+          <p:cNvPr id="2" name="Marcador de imagen de diapositiva 1"/>
+          <p:cNvSpPr>
+            <a:spLocks noGrp="1" noRot="1" noChangeAspect="1"/>
+          </p:cNvSpPr>
+          <p:nvPr>
+            <p:ph type="sldImg"/>
+          </p:nvPr>
+        </p:nvSpPr>
+        <p:spPr/>
+      </p:sp>
+      <p:sp>
+        <p:nvSpPr>
+          <p:cNvPr id="3" name="Marcador de notas 2"/>
+          <p:cNvSpPr>
+            <a:spLocks noGrp="1"/>
+          </p:cNvSpPr>
+          <p:nvPr>
+            <p:ph type="body" idx="1"/>
+          </p:nvPr>
+        </p:nvSpPr>
+        <p:spPr/>
+        <p:txBody>
+          <a:bodyPr/>
+          <a:lstStyle/>
+          <a:p>
+            <a:endParaRPr lang="es-ES" dirty="0"/>
+          </a:p>
+        </p:txBody>
+      </p:sp>
+      <p:sp>
+        <p:nvSpPr>
+          <p:cNvPr id="4" name="Marcador de número de diapositiva 3"/>
+          <p:cNvSpPr>
+            <a:spLocks noGrp="1"/>
+          </p:cNvSpPr>
+          <p:nvPr>
+            <p:ph type="sldNum" sz="quarter" idx="5"/>
+          </p:nvPr>
+        </p:nvSpPr>
+        <p:spPr/>
+        <p:txBody>
+          <a:bodyPr/>
+          <a:lstStyle/>
+          <a:p>
+            <a:fld id="{8B9AE26B-B888-4119-B89A-CB927C77B7F8}" type="slidenum">
+              <a:rPr lang="es-ES" smtClean="0"/>
+              <a:t>2</a:t>
+            </a:fld>
+            <a:endParaRPr lang="es-ES" dirty="0"/>
+          </a:p>
+        </p:txBody>
+      </p:sp>
+    </p:spTree>
+    <p:extLst>
+      <p:ext uri="{BB962C8B-B14F-4D97-AF65-F5344CB8AC3E}">
+        <p14:creationId xmlns:p14="http://schemas.microsoft.com/office/powerpoint/2010/main" val="2611862906"/>
+      </p:ext>
+    </p:extLst>
+  </p:cSld>
+  <p:clrMapOvr>
+    <a:masterClrMapping/>
+  </p:clrMapOvr>
+</p:notes>
+</file>
+
+<file path=ppt/notesSlides/notesSlide3.xml><?xml version="1.0" encoding="utf-8"?>
+<p:notes xmlns:a="http://schemas.openxmlformats.org/drawingml/2006/main" xmlns:r="http://schemas.openxmlformats.org/officeDocument/2006/relationships" xmlns:p="http://schemas.openxmlformats.org/presentationml/2006/main">
+  <p:cSld>
+    <p:spTree>
+      <p:nvGrpSpPr>
+        <p:cNvPr id="1" name=""/>
+        <p:cNvGrpSpPr/>
+        <p:nvPr/>
+      </p:nvGrpSpPr>
+      <p:grpSpPr>
+        <a:xfrm>
+          <a:off x="0" y="0"/>
+          <a:ext cx="0" cy="0"/>
+          <a:chOff x="0" y="0"/>
+          <a:chExt cx="0" cy="0"/>
+        </a:xfrm>
+      </p:grpSpPr>
+      <p:sp>
+        <p:nvSpPr>
+          <p:cNvPr id="2" name="Marcador de imagen de diapositiva 1"/>
+          <p:cNvSpPr>
+            <a:spLocks noGrp="1" noRot="1" noChangeAspect="1"/>
+          </p:cNvSpPr>
+          <p:nvPr>
+            <p:ph type="sldImg"/>
+          </p:nvPr>
+        </p:nvSpPr>
+        <p:spPr/>
+      </p:sp>
+      <p:sp>
+        <p:nvSpPr>
+          <p:cNvPr id="3" name="Marcador de notas 2"/>
+          <p:cNvSpPr>
+            <a:spLocks noGrp="1"/>
+          </p:cNvSpPr>
+          <p:nvPr>
+            <p:ph type="body" idx="1"/>
+          </p:nvPr>
+        </p:nvSpPr>
+        <p:spPr/>
+        <p:txBody>
+          <a:bodyPr/>
+          <a:lstStyle/>
+          <a:p>
+            <a:endParaRPr lang="es-ES" dirty="0"/>
+          </a:p>
+        </p:txBody>
+      </p:sp>
+      <p:sp>
+        <p:nvSpPr>
+          <p:cNvPr id="4" name="Marcador de número de diapositiva 3"/>
+          <p:cNvSpPr>
+            <a:spLocks noGrp="1"/>
+          </p:cNvSpPr>
+          <p:nvPr>
+            <p:ph type="sldNum" sz="quarter" idx="5"/>
+          </p:nvPr>
+        </p:nvSpPr>
+        <p:spPr/>
+        <p:txBody>
+          <a:bodyPr/>
+          <a:lstStyle/>
+          <a:p>
+            <a:fld id="{8B9AE26B-B888-4119-B89A-CB927C77B7F8}" type="slidenum">
+              <a:rPr lang="es-ES" smtClean="0"/>
+              <a:t>3</a:t>
+            </a:fld>
+            <a:endParaRPr lang="es-ES" dirty="0"/>
+          </a:p>
+        </p:txBody>
+      </p:sp>
+    </p:spTree>
+    <p:extLst>
+      <p:ext uri="{BB962C8B-B14F-4D97-AF65-F5344CB8AC3E}">
+        <p14:creationId xmlns:p14="http://schemas.microsoft.com/office/powerpoint/2010/main" val="2375073851"/>
+      </p:ext>
+    </p:extLst>
+  </p:cSld>
+  <p:clrMapOvr>
+    <a:masterClrMapping/>
+  </p:clrMapOvr>
+</p:notes>
+</file>
+
+<file path=ppt/notesSlides/notesSlide4.xml><?xml version="1.0" encoding="utf-8"?>
+<p:notes xmlns:a="http://schemas.openxmlformats.org/drawingml/2006/main" xmlns:r="http://schemas.openxmlformats.org/officeDocument/2006/relationships" xmlns:p="http://schemas.openxmlformats.org/presentationml/2006/main">
+  <p:cSld>
+    <p:spTree>
+      <p:nvGrpSpPr>
+        <p:cNvPr id="1" name=""/>
+        <p:cNvGrpSpPr/>
+        <p:nvPr/>
+      </p:nvGrpSpPr>
+      <p:grpSpPr>
+        <a:xfrm>
+          <a:off x="0" y="0"/>
+          <a:ext cx="0" cy="0"/>
+          <a:chOff x="0" y="0"/>
+          <a:chExt cx="0" cy="0"/>
+        </a:xfrm>
+      </p:grpSpPr>
+      <p:sp>
+        <p:nvSpPr>
+          <p:cNvPr id="2" name="Marcador de imagen de diapositiva 1"/>
+          <p:cNvSpPr>
+            <a:spLocks noGrp="1" noRot="1" noChangeAspect="1"/>
+          </p:cNvSpPr>
+          <p:nvPr>
+            <p:ph type="sldImg"/>
+          </p:nvPr>
+        </p:nvSpPr>
+        <p:spPr/>
+      </p:sp>
+      <p:sp>
+        <p:nvSpPr>
+          <p:cNvPr id="3" name="Marcador de notas 2"/>
+          <p:cNvSpPr>
+            <a:spLocks noGrp="1"/>
+          </p:cNvSpPr>
+          <p:nvPr>
+            <p:ph type="body" idx="1"/>
+          </p:nvPr>
+        </p:nvSpPr>
+        <p:spPr/>
+        <p:txBody>
+          <a:bodyPr/>
+          <a:lstStyle/>
+          <a:p>
+            <a:endParaRPr lang="es-ES" dirty="0"/>
+          </a:p>
+        </p:txBody>
+      </p:sp>
+      <p:sp>
+        <p:nvSpPr>
+          <p:cNvPr id="4" name="Marcador de número de diapositiva 3"/>
+          <p:cNvSpPr>
+            <a:spLocks noGrp="1"/>
+          </p:cNvSpPr>
+          <p:nvPr>
+            <p:ph type="sldNum" sz="quarter" idx="5"/>
+          </p:nvPr>
+        </p:nvSpPr>
+        <p:spPr/>
+        <p:txBody>
+          <a:bodyPr/>
+          <a:lstStyle/>
+          <a:p>
+            <a:fld id="{8B9AE26B-B888-4119-B89A-CB927C77B7F8}" type="slidenum">
+              <a:rPr lang="es-ES" smtClean="0"/>
+              <a:t>4</a:t>
+            </a:fld>
+            <a:endParaRPr lang="es-ES" dirty="0"/>
+          </a:p>
+        </p:txBody>
+      </p:sp>
+    </p:spTree>
+    <p:extLst>
+      <p:ext uri="{BB962C8B-B14F-4D97-AF65-F5344CB8AC3E}">
+        <p14:creationId xmlns:p14="http://schemas.microsoft.com/office/powerpoint/2010/main" val="4182377725"/>
+      </p:ext>
+    </p:extLst>
+  </p:cSld>
+  <p:clrMapOvr>
+    <a:masterClrMapping/>
+  </p:clrMapOvr>
+</p:notes>
+</file>
+
+<file path=ppt/notesSlides/notesSlide5.xml><?xml version="1.0" encoding="utf-8"?>
+<p:notes xmlns:a="http://schemas.openxmlformats.org/drawingml/2006/main" xmlns:r="http://schemas.openxmlformats.org/officeDocument/2006/relationships" xmlns:p="http://schemas.openxmlformats.org/presentationml/2006/main">
+  <p:cSld>
+    <p:spTree>
+      <p:nvGrpSpPr>
+        <p:cNvPr id="1" name=""/>
+        <p:cNvGrpSpPr/>
+        <p:nvPr/>
+      </p:nvGrpSpPr>
+      <p:grpSpPr>
+        <a:xfrm>
+          <a:off x="0" y="0"/>
+          <a:ext cx="0" cy="0"/>
+          <a:chOff x="0" y="0"/>
+          <a:chExt cx="0" cy="0"/>
+        </a:xfrm>
+      </p:grpSpPr>
+      <p:sp>
+        <p:nvSpPr>
+          <p:cNvPr id="2" name="Marcador de imagen de diapositiva 1"/>
+          <p:cNvSpPr>
+            <a:spLocks noGrp="1" noRot="1" noChangeAspect="1"/>
+          </p:cNvSpPr>
+          <p:nvPr>
+            <p:ph type="sldImg"/>
+          </p:nvPr>
+        </p:nvSpPr>
+        <p:spPr/>
+      </p:sp>
+      <p:sp>
+        <p:nvSpPr>
+          <p:cNvPr id="3" name="Marcador de notas 2"/>
+          <p:cNvSpPr>
+            <a:spLocks noGrp="1"/>
+          </p:cNvSpPr>
+          <p:nvPr>
+            <p:ph type="body" idx="1"/>
+          </p:nvPr>
+        </p:nvSpPr>
+        <p:spPr/>
+        <p:txBody>
+          <a:bodyPr/>
+          <a:lstStyle/>
+          <a:p>
+            <a:endParaRPr lang="es-ES" dirty="0"/>
+          </a:p>
+        </p:txBody>
+      </p:sp>
+      <p:sp>
+        <p:nvSpPr>
+          <p:cNvPr id="4" name="Marcador de número de diapositiva 3"/>
+          <p:cNvSpPr>
+            <a:spLocks noGrp="1"/>
+          </p:cNvSpPr>
+          <p:nvPr>
+            <p:ph type="sldNum" sz="quarter" idx="5"/>
+          </p:nvPr>
+        </p:nvSpPr>
+        <p:spPr/>
+        <p:txBody>
+          <a:bodyPr/>
+          <a:lstStyle/>
+          <a:p>
+            <a:fld id="{8B9AE26B-B888-4119-B89A-CB927C77B7F8}" type="slidenum">
+              <a:rPr lang="es-ES" smtClean="0"/>
+              <a:t>5</a:t>
+            </a:fld>
+            <a:endParaRPr lang="es-ES" dirty="0"/>
+          </a:p>
+        </p:txBody>
+      </p:sp>
+    </p:spTree>
+    <p:extLst>
+      <p:ext uri="{BB962C8B-B14F-4D97-AF65-F5344CB8AC3E}">
+        <p14:creationId xmlns:p14="http://schemas.microsoft.com/office/powerpoint/2010/main" val="3882368919"/>
+      </p:ext>
+    </p:extLst>
+  </p:cSld>
+  <p:clrMapOvr>
+    <a:masterClrMapping/>
+  </p:clrMapOvr>
+</p:notes>
+</file>
+
+<file path=ppt/notesSlides/notesSlide6.xml><?xml version="1.0" encoding="utf-8"?>
+<p:notes xmlns:a="http://schemas.openxmlformats.org/drawingml/2006/main" xmlns:r="http://schemas.openxmlformats.org/officeDocument/2006/relationships" xmlns:p="http://schemas.openxmlformats.org/presentationml/2006/main">
+  <p:cSld>
+    <p:spTree>
+      <p:nvGrpSpPr>
+        <p:cNvPr id="1" name=""/>
+        <p:cNvGrpSpPr/>
+        <p:nvPr/>
+      </p:nvGrpSpPr>
+      <p:grpSpPr>
+        <a:xfrm>
+          <a:off x="0" y="0"/>
+          <a:ext cx="0" cy="0"/>
+          <a:chOff x="0" y="0"/>
+          <a:chExt cx="0" cy="0"/>
+        </a:xfrm>
+      </p:grpSpPr>
+      <p:sp>
+        <p:nvSpPr>
+          <p:cNvPr id="2" name="Marcador de imagen de diapositiva 1"/>
+          <p:cNvSpPr>
+            <a:spLocks noGrp="1" noRot="1" noChangeAspect="1"/>
+          </p:cNvSpPr>
+          <p:nvPr>
+            <p:ph type="sldImg"/>
+          </p:nvPr>
+        </p:nvSpPr>
+        <p:spPr/>
+      </p:sp>
+      <p:sp>
+        <p:nvSpPr>
+          <p:cNvPr id="3" name="Marcador de notas 2"/>
+          <p:cNvSpPr>
+            <a:spLocks noGrp="1"/>
+          </p:cNvSpPr>
+          <p:nvPr>
+            <p:ph type="body" idx="1"/>
+          </p:nvPr>
+        </p:nvSpPr>
+        <p:spPr/>
+        <p:txBody>
+          <a:bodyPr/>
+          <a:lstStyle/>
+          <a:p>
+            <a:endParaRPr lang="es-ES" dirty="0"/>
+          </a:p>
+        </p:txBody>
+      </p:sp>
+      <p:sp>
+        <p:nvSpPr>
+          <p:cNvPr id="4" name="Marcador de número de diapositiva 3"/>
+          <p:cNvSpPr>
+            <a:spLocks noGrp="1"/>
+          </p:cNvSpPr>
+          <p:nvPr>
+            <p:ph type="sldNum" sz="quarter" idx="5"/>
+          </p:nvPr>
+        </p:nvSpPr>
+        <p:spPr/>
+        <p:txBody>
+          <a:bodyPr/>
+          <a:lstStyle/>
+          <a:p>
+            <a:fld id="{8B9AE26B-B888-4119-B89A-CB927C77B7F8}" type="slidenum">
+              <a:rPr lang="es-ES" smtClean="0"/>
+              <a:t>6</a:t>
+            </a:fld>
+            <a:endParaRPr lang="es-ES" dirty="0"/>
+          </a:p>
+        </p:txBody>
+      </p:sp>
+    </p:spTree>
+    <p:extLst>
+      <p:ext uri="{BB962C8B-B14F-4D97-AF65-F5344CB8AC3E}">
+        <p14:creationId xmlns:p14="http://schemas.microsoft.com/office/powerpoint/2010/main" val="1639184935"/>
+      </p:ext>
+    </p:extLst>
+  </p:cSld>
+  <p:clrMapOvr>
+    <a:masterClrMapping/>
+  </p:clrMapOvr>
+</p:notes>
+</file>
+
+<file path=ppt/notesSlides/notesSlide7.xml><?xml version="1.0" encoding="utf-8"?>
+<p:notes xmlns:a="http://schemas.openxmlformats.org/drawingml/2006/main" xmlns:r="http://schemas.openxmlformats.org/officeDocument/2006/relationships" xmlns:p="http://schemas.openxmlformats.org/presentationml/2006/main">
+  <p:cSld>
+    <p:spTree>
+      <p:nvGrpSpPr>
+        <p:cNvPr id="1" name=""/>
+        <p:cNvGrpSpPr/>
+        <p:nvPr/>
+      </p:nvGrpSpPr>
+      <p:grpSpPr>
+        <a:xfrm>
+          <a:off x="0" y="0"/>
+          <a:ext cx="0" cy="0"/>
+          <a:chOff x="0" y="0"/>
+          <a:chExt cx="0" cy="0"/>
+        </a:xfrm>
+      </p:grpSpPr>
+      <p:sp>
+        <p:nvSpPr>
+          <p:cNvPr id="2" name="Marcador de imagen de diapositiva 1"/>
+          <p:cNvSpPr>
+            <a:spLocks noGrp="1" noRot="1" noChangeAspect="1"/>
+          </p:cNvSpPr>
+          <p:nvPr>
+            <p:ph type="sldImg"/>
+          </p:nvPr>
+        </p:nvSpPr>
+        <p:spPr/>
+      </p:sp>
+      <p:sp>
+        <p:nvSpPr>
+          <p:cNvPr id="3" name="Marcador de notas 2"/>
+          <p:cNvSpPr>
+            <a:spLocks noGrp="1"/>
+          </p:cNvSpPr>
+          <p:nvPr>
+            <p:ph type="body" idx="1"/>
+          </p:nvPr>
+        </p:nvSpPr>
+        <p:spPr/>
+        <p:txBody>
+          <a:bodyPr/>
+          <a:lstStyle/>
+          <a:p>
+            <a:endParaRPr lang="es-ES" dirty="0"/>
+          </a:p>
+        </p:txBody>
+      </p:sp>
+      <p:sp>
+        <p:nvSpPr>
+          <p:cNvPr id="4" name="Marcador de número de diapositiva 3"/>
+          <p:cNvSpPr>
+            <a:spLocks noGrp="1"/>
+          </p:cNvSpPr>
+          <p:nvPr>
+            <p:ph type="sldNum" sz="quarter" idx="5"/>
+          </p:nvPr>
+        </p:nvSpPr>
+        <p:spPr/>
+        <p:txBody>
+          <a:bodyPr/>
+          <a:lstStyle/>
+          <a:p>
+            <a:fld id="{8B9AE26B-B888-4119-B89A-CB927C77B7F8}" type="slidenum">
+              <a:rPr lang="es-ES" smtClean="0"/>
+              <a:t>7</a:t>
+            </a:fld>
+            <a:endParaRPr lang="es-ES" dirty="0"/>
+          </a:p>
+        </p:txBody>
+      </p:sp>
+    </p:spTree>
+    <p:extLst>
+      <p:ext uri="{BB962C8B-B14F-4D97-AF65-F5344CB8AC3E}">
+        <p14:creationId xmlns:p14="http://schemas.microsoft.com/office/powerpoint/2010/main" val="4225558330"/>
+      </p:ext>
+    </p:extLst>
+  </p:cSld>
+  <p:clrMapOvr>
+    <a:masterClrMapping/>
+  </p:clrMapOvr>
+</p:notes>
+</file>
+
+<file path=ppt/notesSlides/notesSlide8.xml><?xml version="1.0" encoding="utf-8"?>
+<p:notes xmlns:a="http://schemas.openxmlformats.org/drawingml/2006/main" xmlns:r="http://schemas.openxmlformats.org/officeDocument/2006/relationships" xmlns:p="http://schemas.openxmlformats.org/presentationml/2006/main">
+  <p:cSld>
+    <p:spTree>
+      <p:nvGrpSpPr>
+        <p:cNvPr id="1" name=""/>
+        <p:cNvGrpSpPr/>
+        <p:nvPr/>
+      </p:nvGrpSpPr>
+      <p:grpSpPr>
+        <a:xfrm>
+          <a:off x="0" y="0"/>
+          <a:ext cx="0" cy="0"/>
+          <a:chOff x="0" y="0"/>
+          <a:chExt cx="0" cy="0"/>
+        </a:xfrm>
+      </p:grpSpPr>
+      <p:sp>
+        <p:nvSpPr>
+          <p:cNvPr id="2" name="Marcador de imagen de diapositiva 1"/>
+          <p:cNvSpPr>
+            <a:spLocks noGrp="1" noRot="1" noChangeAspect="1"/>
+          </p:cNvSpPr>
+          <p:nvPr>
+            <p:ph type="sldImg"/>
+          </p:nvPr>
+        </p:nvSpPr>
+        <p:spPr/>
+      </p:sp>
+      <p:sp>
+        <p:nvSpPr>
+          <p:cNvPr id="3" name="Marcador de notas 2"/>
+          <p:cNvSpPr>
+            <a:spLocks noGrp="1"/>
+          </p:cNvSpPr>
+          <p:nvPr>
+            <p:ph type="body" idx="1"/>
+          </p:nvPr>
+        </p:nvSpPr>
+        <p:spPr/>
+        <p:txBody>
+          <a:bodyPr/>
+          <a:lstStyle/>
+          <a:p>
+            <a:endParaRPr lang="es-ES" dirty="0"/>
+          </a:p>
+        </p:txBody>
+      </p:sp>
+      <p:sp>
+        <p:nvSpPr>
+          <p:cNvPr id="4" name="Marcador de número de diapositiva 3"/>
+          <p:cNvSpPr>
+            <a:spLocks noGrp="1"/>
+          </p:cNvSpPr>
+          <p:nvPr>
+            <p:ph type="sldNum" sz="quarter" idx="5"/>
+          </p:nvPr>
+        </p:nvSpPr>
+        <p:spPr/>
+        <p:txBody>
+          <a:bodyPr/>
+          <a:lstStyle/>
+          <a:p>
+            <a:fld id="{8B9AE26B-B888-4119-B89A-CB927C77B7F8}" type="slidenum">
+              <a:rPr lang="es-ES" smtClean="0"/>
+              <a:t>8</a:t>
+            </a:fld>
+            <a:endParaRPr lang="es-ES" dirty="0"/>
+          </a:p>
+        </p:txBody>
+      </p:sp>
+    </p:spTree>
+    <p:extLst>
+      <p:ext uri="{BB962C8B-B14F-4D97-AF65-F5344CB8AC3E}">
+        <p14:creationId xmlns:p14="http://schemas.microsoft.com/office/powerpoint/2010/main" val="1852092699"/>
+      </p:ext>
+    </p:extLst>
+  </p:cSld>
+  <p:clrMapOvr>
+    <a:masterClrMapping/>
+  </p:clrMapOvr>
+</p:notes>
+</file>
+
+<file path=ppt/notesSlides/notesSlide9.xml><?xml version="1.0" encoding="utf-8"?>
+<p:notes xmlns:a="http://schemas.openxmlformats.org/drawingml/2006/main" xmlns:r="http://schemas.openxmlformats.org/officeDocument/2006/relationships" xmlns:p="http://schemas.openxmlformats.org/presentationml/2006/main">
+  <p:cSld>
+    <p:spTree>
+      <p:nvGrpSpPr>
+        <p:cNvPr id="1" name=""/>
+        <p:cNvGrpSpPr/>
+        <p:nvPr/>
+      </p:nvGrpSpPr>
+      <p:grpSpPr>
+        <a:xfrm>
+          <a:off x="0" y="0"/>
+          <a:ext cx="0" cy="0"/>
+          <a:chOff x="0" y="0"/>
+          <a:chExt cx="0" cy="0"/>
+        </a:xfrm>
+      </p:grpSpPr>
+      <p:sp>
+        <p:nvSpPr>
+          <p:cNvPr id="2" name="Marcador de imagen de diapositiva 1"/>
+          <p:cNvSpPr>
+            <a:spLocks noGrp="1" noRot="1" noChangeAspect="1"/>
+          </p:cNvSpPr>
+          <p:nvPr>
+            <p:ph type="sldImg"/>
+          </p:nvPr>
+        </p:nvSpPr>
+        <p:spPr/>
+      </p:sp>
+      <p:sp>
+        <p:nvSpPr>
+          <p:cNvPr id="3" name="Marcador de notas 2"/>
+          <p:cNvSpPr>
+            <a:spLocks noGrp="1"/>
+          </p:cNvSpPr>
+          <p:nvPr>
+            <p:ph type="body" idx="1"/>
+          </p:nvPr>
+        </p:nvSpPr>
+        <p:spPr/>
+        <p:txBody>
+          <a:bodyPr/>
+          <a:lstStyle/>
+          <a:p>
+            <a:endParaRPr lang="es-ES" dirty="0"/>
+          </a:p>
+        </p:txBody>
+      </p:sp>
+      <p:sp>
+        <p:nvSpPr>
+          <p:cNvPr id="4" name="Marcador de número de diapositiva 3"/>
+          <p:cNvSpPr>
+            <a:spLocks noGrp="1"/>
+          </p:cNvSpPr>
+          <p:nvPr>
+            <p:ph type="sldNum" sz="quarter" idx="5"/>
+          </p:nvPr>
+        </p:nvSpPr>
+        <p:spPr/>
+        <p:txBody>
+          <a:bodyPr/>
+          <a:lstStyle/>
+          <a:p>
+            <a:fld id="{8B9AE26B-B888-4119-B89A-CB927C77B7F8}" type="slidenum">
+              <a:rPr lang="es-ES" smtClean="0"/>
+              <a:t>9</a:t>
+            </a:fld>
+            <a:endParaRPr lang="es-ES" dirty="0"/>
+          </a:p>
+        </p:txBody>
+      </p:sp>
+    </p:spTree>
+    <p:extLst>
+      <p:ext uri="{BB962C8B-B14F-4D97-AF65-F5344CB8AC3E}">
+        <p14:creationId xmlns:p14="http://schemas.microsoft.com/office/powerpoint/2010/main" val="3833255394"/>
+      </p:ext>
+    </p:extLst>
+  </p:cSld>
+  <p:clrMapOvr>
+    <a:masterClrMapping/>
+  </p:clrMapOvr>
+</p:notes>
+</file>
+
 <file path=ppt/slideLayouts/slideLayout1.xml><?xml version="1.0" encoding="utf-8"?>
 <p:sldLayout xmlns:a="http://schemas.openxmlformats.org/drawingml/2006/main" xmlns:r="http://schemas.openxmlformats.org/officeDocument/2006/relationships" xmlns:p="http://schemas.openxmlformats.org/presentationml/2006/main" type="title" preserve="1">
   <p:cSld name="Diapositiva de título">
@@ -623,9 +1463,9 @@
           <a:p>
             <a:fld id="{9CC47807-5F4F-460D-8464-AAC9D781ED2A}" type="datetimeFigureOut">
               <a:rPr lang="es-ES" smtClean="0"/>
-              <a:t>06/05/2025</a:t>
+              <a:t>13/06/2025</a:t>
             </a:fld>
-            <a:endParaRPr lang="es-ES"/>
+            <a:endParaRPr lang="es-ES" dirty="0"/>
           </a:p>
         </p:txBody>
       </p:sp>
@@ -650,7 +1490,7 @@
           <a:bodyPr/>
           <a:lstStyle/>
           <a:p>
-            <a:endParaRPr lang="es-ES"/>
+            <a:endParaRPr lang="es-ES" dirty="0"/>
           </a:p>
         </p:txBody>
       </p:sp>
@@ -679,7 +1519,7 @@
               <a:rPr lang="es-ES" smtClean="0"/>
               <a:t>‹Nº›</a:t>
             </a:fld>
-            <a:endParaRPr lang="es-ES"/>
+            <a:endParaRPr lang="es-ES" dirty="0"/>
           </a:p>
         </p:txBody>
       </p:sp>
@@ -821,9 +1661,9 @@
           <a:p>
             <a:fld id="{9CC47807-5F4F-460D-8464-AAC9D781ED2A}" type="datetimeFigureOut">
               <a:rPr lang="es-ES" smtClean="0"/>
-              <a:t>06/05/2025</a:t>
+              <a:t>13/06/2025</a:t>
             </a:fld>
-            <a:endParaRPr lang="es-ES"/>
+            <a:endParaRPr lang="es-ES" dirty="0"/>
           </a:p>
         </p:txBody>
       </p:sp>
@@ -848,7 +1688,7 @@
           <a:bodyPr/>
           <a:lstStyle/>
           <a:p>
-            <a:endParaRPr lang="es-ES"/>
+            <a:endParaRPr lang="es-ES" dirty="0"/>
           </a:p>
         </p:txBody>
       </p:sp>
@@ -877,7 +1717,7 @@
               <a:rPr lang="es-ES" smtClean="0"/>
               <a:t>‹Nº›</a:t>
             </a:fld>
-            <a:endParaRPr lang="es-ES"/>
+            <a:endParaRPr lang="es-ES" dirty="0"/>
           </a:p>
         </p:txBody>
       </p:sp>
@@ -1029,9 +1869,9 @@
           <a:p>
             <a:fld id="{9CC47807-5F4F-460D-8464-AAC9D781ED2A}" type="datetimeFigureOut">
               <a:rPr lang="es-ES" smtClean="0"/>
-              <a:t>06/05/2025</a:t>
+              <a:t>13/06/2025</a:t>
             </a:fld>
-            <a:endParaRPr lang="es-ES"/>
+            <a:endParaRPr lang="es-ES" dirty="0"/>
           </a:p>
         </p:txBody>
       </p:sp>
@@ -1056,7 +1896,7 @@
           <a:bodyPr/>
           <a:lstStyle/>
           <a:p>
-            <a:endParaRPr lang="es-ES"/>
+            <a:endParaRPr lang="es-ES" dirty="0"/>
           </a:p>
         </p:txBody>
       </p:sp>
@@ -1085,7 +1925,7 @@
               <a:rPr lang="es-ES" smtClean="0"/>
               <a:t>‹Nº›</a:t>
             </a:fld>
-            <a:endParaRPr lang="es-ES"/>
+            <a:endParaRPr lang="es-ES" dirty="0"/>
           </a:p>
         </p:txBody>
       </p:sp>
@@ -1227,9 +2067,9 @@
           <a:p>
             <a:fld id="{9CC47807-5F4F-460D-8464-AAC9D781ED2A}" type="datetimeFigureOut">
               <a:rPr lang="es-ES" smtClean="0"/>
-              <a:t>06/05/2025</a:t>
+              <a:t>13/06/2025</a:t>
             </a:fld>
-            <a:endParaRPr lang="es-ES"/>
+            <a:endParaRPr lang="es-ES" dirty="0"/>
           </a:p>
         </p:txBody>
       </p:sp>
@@ -1254,7 +2094,7 @@
           <a:bodyPr/>
           <a:lstStyle/>
           <a:p>
-            <a:endParaRPr lang="es-ES"/>
+            <a:endParaRPr lang="es-ES" dirty="0"/>
           </a:p>
         </p:txBody>
       </p:sp>
@@ -1283,7 +2123,7 @@
               <a:rPr lang="es-ES" smtClean="0"/>
               <a:t>‹Nº›</a:t>
             </a:fld>
-            <a:endParaRPr lang="es-ES"/>
+            <a:endParaRPr lang="es-ES" dirty="0"/>
           </a:p>
         </p:txBody>
       </p:sp>
@@ -1502,9 +2342,9 @@
           <a:p>
             <a:fld id="{9CC47807-5F4F-460D-8464-AAC9D781ED2A}" type="datetimeFigureOut">
               <a:rPr lang="es-ES" smtClean="0"/>
-              <a:t>06/05/2025</a:t>
+              <a:t>13/06/2025</a:t>
             </a:fld>
-            <a:endParaRPr lang="es-ES"/>
+            <a:endParaRPr lang="es-ES" dirty="0"/>
           </a:p>
         </p:txBody>
       </p:sp>
@@ -1529,7 +2369,7 @@
           <a:bodyPr/>
           <a:lstStyle/>
           <a:p>
-            <a:endParaRPr lang="es-ES"/>
+            <a:endParaRPr lang="es-ES" dirty="0"/>
           </a:p>
         </p:txBody>
       </p:sp>
@@ -1558,7 +2398,7 @@
               <a:rPr lang="es-ES" smtClean="0"/>
               <a:t>‹Nº›</a:t>
             </a:fld>
-            <a:endParaRPr lang="es-ES"/>
+            <a:endParaRPr lang="es-ES" dirty="0"/>
           </a:p>
         </p:txBody>
       </p:sp>
@@ -1767,9 +2607,9 @@
           <a:p>
             <a:fld id="{9CC47807-5F4F-460D-8464-AAC9D781ED2A}" type="datetimeFigureOut">
               <a:rPr lang="es-ES" smtClean="0"/>
-              <a:t>06/05/2025</a:t>
+              <a:t>13/06/2025</a:t>
             </a:fld>
-            <a:endParaRPr lang="es-ES"/>
+            <a:endParaRPr lang="es-ES" dirty="0"/>
           </a:p>
         </p:txBody>
       </p:sp>
@@ -1794,7 +2634,7 @@
           <a:bodyPr/>
           <a:lstStyle/>
           <a:p>
-            <a:endParaRPr lang="es-ES"/>
+            <a:endParaRPr lang="es-ES" dirty="0"/>
           </a:p>
         </p:txBody>
       </p:sp>
@@ -1823,7 +2663,7 @@
               <a:rPr lang="es-ES" smtClean="0"/>
               <a:t>‹Nº›</a:t>
             </a:fld>
-            <a:endParaRPr lang="es-ES"/>
+            <a:endParaRPr lang="es-ES" dirty="0"/>
           </a:p>
         </p:txBody>
       </p:sp>
@@ -2179,9 +3019,9 @@
           <a:p>
             <a:fld id="{9CC47807-5F4F-460D-8464-AAC9D781ED2A}" type="datetimeFigureOut">
               <a:rPr lang="es-ES" smtClean="0"/>
-              <a:t>06/05/2025</a:t>
+              <a:t>13/06/2025</a:t>
             </a:fld>
-            <a:endParaRPr lang="es-ES"/>
+            <a:endParaRPr lang="es-ES" dirty="0"/>
           </a:p>
         </p:txBody>
       </p:sp>
@@ -2206,7 +3046,7 @@
           <a:bodyPr/>
           <a:lstStyle/>
           <a:p>
-            <a:endParaRPr lang="es-ES"/>
+            <a:endParaRPr lang="es-ES" dirty="0"/>
           </a:p>
         </p:txBody>
       </p:sp>
@@ -2235,7 +3075,7 @@
               <a:rPr lang="es-ES" smtClean="0"/>
               <a:t>‹Nº›</a:t>
             </a:fld>
-            <a:endParaRPr lang="es-ES"/>
+            <a:endParaRPr lang="es-ES" dirty="0"/>
           </a:p>
         </p:txBody>
       </p:sp>
@@ -2320,9 +3160,9 @@
           <a:p>
             <a:fld id="{9CC47807-5F4F-460D-8464-AAC9D781ED2A}" type="datetimeFigureOut">
               <a:rPr lang="es-ES" smtClean="0"/>
-              <a:t>06/05/2025</a:t>
+              <a:t>13/06/2025</a:t>
             </a:fld>
-            <a:endParaRPr lang="es-ES"/>
+            <a:endParaRPr lang="es-ES" dirty="0"/>
           </a:p>
         </p:txBody>
       </p:sp>
@@ -2347,7 +3187,7 @@
           <a:bodyPr/>
           <a:lstStyle/>
           <a:p>
-            <a:endParaRPr lang="es-ES"/>
+            <a:endParaRPr lang="es-ES" dirty="0"/>
           </a:p>
         </p:txBody>
       </p:sp>
@@ -2376,7 +3216,7 @@
               <a:rPr lang="es-ES" smtClean="0"/>
               <a:t>‹Nº›</a:t>
             </a:fld>
-            <a:endParaRPr lang="es-ES"/>
+            <a:endParaRPr lang="es-ES" dirty="0"/>
           </a:p>
         </p:txBody>
       </p:sp>
@@ -2433,9 +3273,9 @@
           <a:p>
             <a:fld id="{9CC47807-5F4F-460D-8464-AAC9D781ED2A}" type="datetimeFigureOut">
               <a:rPr lang="es-ES" smtClean="0"/>
-              <a:t>06/05/2025</a:t>
+              <a:t>13/06/2025</a:t>
             </a:fld>
-            <a:endParaRPr lang="es-ES"/>
+            <a:endParaRPr lang="es-ES" dirty="0"/>
           </a:p>
         </p:txBody>
       </p:sp>
@@ -2460,7 +3300,7 @@
           <a:bodyPr/>
           <a:lstStyle/>
           <a:p>
-            <a:endParaRPr lang="es-ES"/>
+            <a:endParaRPr lang="es-ES" dirty="0"/>
           </a:p>
         </p:txBody>
       </p:sp>
@@ -2489,7 +3329,7 @@
               <a:rPr lang="es-ES" smtClean="0"/>
               <a:t>‹Nº›</a:t>
             </a:fld>
-            <a:endParaRPr lang="es-ES"/>
+            <a:endParaRPr lang="es-ES" dirty="0"/>
           </a:p>
         </p:txBody>
       </p:sp>
@@ -2744,9 +3584,9 @@
           <a:p>
             <a:fld id="{9CC47807-5F4F-460D-8464-AAC9D781ED2A}" type="datetimeFigureOut">
               <a:rPr lang="es-ES" smtClean="0"/>
-              <a:t>06/05/2025</a:t>
+              <a:t>13/06/2025</a:t>
             </a:fld>
-            <a:endParaRPr lang="es-ES"/>
+            <a:endParaRPr lang="es-ES" dirty="0"/>
           </a:p>
         </p:txBody>
       </p:sp>
@@ -2771,7 +3611,7 @@
           <a:bodyPr/>
           <a:lstStyle/>
           <a:p>
-            <a:endParaRPr lang="es-ES"/>
+            <a:endParaRPr lang="es-ES" dirty="0"/>
           </a:p>
         </p:txBody>
       </p:sp>
@@ -2800,7 +3640,7 @@
               <a:rPr lang="es-ES" smtClean="0"/>
               <a:t>‹Nº›</a:t>
             </a:fld>
-            <a:endParaRPr lang="es-ES"/>
+            <a:endParaRPr lang="es-ES" dirty="0"/>
           </a:p>
         </p:txBody>
       </p:sp>
@@ -2934,7 +3774,7 @@
             </a:lvl9pPr>
           </a:lstStyle>
           <a:p>
-            <a:endParaRPr lang="es-ES"/>
+            <a:endParaRPr lang="es-ES" dirty="0"/>
           </a:p>
         </p:txBody>
       </p:sp>
@@ -3032,9 +3872,9 @@
           <a:p>
             <a:fld id="{9CC47807-5F4F-460D-8464-AAC9D781ED2A}" type="datetimeFigureOut">
               <a:rPr lang="es-ES" smtClean="0"/>
-              <a:t>06/05/2025</a:t>
+              <a:t>13/06/2025</a:t>
             </a:fld>
-            <a:endParaRPr lang="es-ES"/>
+            <a:endParaRPr lang="es-ES" dirty="0"/>
           </a:p>
         </p:txBody>
       </p:sp>
@@ -3059,7 +3899,7 @@
           <a:bodyPr/>
           <a:lstStyle/>
           <a:p>
-            <a:endParaRPr lang="es-ES"/>
+            <a:endParaRPr lang="es-ES" dirty="0"/>
           </a:p>
         </p:txBody>
       </p:sp>
@@ -3088,7 +3928,7 @@
               <a:rPr lang="es-ES" smtClean="0"/>
               <a:t>‹Nº›</a:t>
             </a:fld>
-            <a:endParaRPr lang="es-ES"/>
+            <a:endParaRPr lang="es-ES" dirty="0"/>
           </a:p>
         </p:txBody>
       </p:sp>
@@ -3273,9 +4113,9 @@
           <a:p>
             <a:fld id="{9CC47807-5F4F-460D-8464-AAC9D781ED2A}" type="datetimeFigureOut">
               <a:rPr lang="es-ES" smtClean="0"/>
-              <a:t>06/05/2025</a:t>
+              <a:t>13/06/2025</a:t>
             </a:fld>
-            <a:endParaRPr lang="es-ES"/>
+            <a:endParaRPr lang="es-ES" dirty="0"/>
           </a:p>
         </p:txBody>
       </p:sp>
@@ -3318,7 +4158,7 @@
             </a:lvl1pPr>
           </a:lstStyle>
           <a:p>
-            <a:endParaRPr lang="es-ES"/>
+            <a:endParaRPr lang="es-ES" dirty="0"/>
           </a:p>
         </p:txBody>
       </p:sp>
@@ -3365,7 +4205,7 @@
               <a:rPr lang="es-ES" smtClean="0"/>
               <a:t>‹Nº›</a:t>
             </a:fld>
-            <a:endParaRPr lang="es-ES"/>
+            <a:endParaRPr lang="es-ES" dirty="0"/>
           </a:p>
         </p:txBody>
       </p:sp>
@@ -3766,7 +4606,7 @@
               <a:t> </a:t>
             </a:r>
             <a:r>
-              <a:rPr lang="es-ES" sz="8800" dirty="0" err="1">
+              <a:rPr lang="es-ES" sz="8800" dirty="0">
                 <a:solidFill>
                   <a:schemeClr val="accent6"/>
                 </a:solidFill>
@@ -3774,12 +4614,6 @@
               </a:rPr>
               <a:t>Nature</a:t>
             </a:r>
-            <a:endParaRPr lang="es-ES" sz="8800" dirty="0">
-              <a:solidFill>
-                <a:schemeClr val="accent6"/>
-              </a:solidFill>
-              <a:latin typeface="Britannic Bold" panose="020B0903060703020204" pitchFamily="34" charset="0"/>
-            </a:endParaRPr>
           </a:p>
         </p:txBody>
       </p:sp>
@@ -3789,42 +4623,6 @@
             <a:extLst>
               <a:ext uri="{FF2B5EF4-FFF2-40B4-BE49-F238E27FC236}">
                 <a16:creationId xmlns:a16="http://schemas.microsoft.com/office/drawing/2014/main" id="{F67F7293-C4C7-0C6F-C521-5323CEB033FD}"/>
-              </a:ext>
-            </a:extLst>
-          </p:cNvPr>
-          <p:cNvPicPr>
-            <a:picLocks noChangeAspect="1"/>
-          </p:cNvPicPr>
-          <p:nvPr/>
-        </p:nvPicPr>
-        <p:blipFill>
-          <a:blip r:embed="rId2">
-            <a:extLst>
-              <a:ext uri="{28A0092B-C50C-407E-A947-70E740481C1C}">
-                <a14:useLocalDpi xmlns:a14="http://schemas.microsoft.com/office/drawing/2010/main" val="0"/>
-              </a:ext>
-            </a:extLst>
-          </a:blip>
-          <a:stretch>
-            <a:fillRect/>
-          </a:stretch>
-        </p:blipFill>
-        <p:spPr>
-          <a:xfrm>
-            <a:off x="484932" y="553377"/>
-            <a:ext cx="7143750" cy="4019550"/>
-          </a:xfrm>
-          <a:prstGeom prst="rect">
-            <a:avLst/>
-          </a:prstGeom>
-        </p:spPr>
-      </p:pic>
-      <p:pic>
-        <p:nvPicPr>
-          <p:cNvPr id="8" name="Imagen 7">
-            <a:extLst>
-              <a:ext uri="{FF2B5EF4-FFF2-40B4-BE49-F238E27FC236}">
-                <a16:creationId xmlns:a16="http://schemas.microsoft.com/office/drawing/2014/main" id="{460D45CB-63D8-7750-0337-B98B1E363F24}"/>
               </a:ext>
             </a:extLst>
           </p:cNvPr>
@@ -3835,6 +4633,42 @@
         </p:nvPicPr>
         <p:blipFill>
           <a:blip r:embed="rId3">
+            <a:extLst>
+              <a:ext uri="{28A0092B-C50C-407E-A947-70E740481C1C}">
+                <a14:useLocalDpi xmlns:a14="http://schemas.microsoft.com/office/drawing/2010/main" val="0"/>
+              </a:ext>
+            </a:extLst>
+          </a:blip>
+          <a:stretch>
+            <a:fillRect/>
+          </a:stretch>
+        </p:blipFill>
+        <p:spPr>
+          <a:xfrm>
+            <a:off x="484932" y="553377"/>
+            <a:ext cx="7143750" cy="4019550"/>
+          </a:xfrm>
+          <a:prstGeom prst="rect">
+            <a:avLst/>
+          </a:prstGeom>
+        </p:spPr>
+      </p:pic>
+      <p:pic>
+        <p:nvPicPr>
+          <p:cNvPr id="8" name="Imagen 7">
+            <a:extLst>
+              <a:ext uri="{FF2B5EF4-FFF2-40B4-BE49-F238E27FC236}">
+                <a16:creationId xmlns:a16="http://schemas.microsoft.com/office/drawing/2014/main" id="{460D45CB-63D8-7750-0337-B98B1E363F24}"/>
+              </a:ext>
+            </a:extLst>
+          </p:cNvPr>
+          <p:cNvPicPr>
+            <a:picLocks noChangeAspect="1"/>
+          </p:cNvPicPr>
+          <p:nvPr/>
+        </p:nvPicPr>
+        <p:blipFill>
+          <a:blip r:embed="rId4">
             <a:extLst>
               <a:ext uri="{28A0092B-C50C-407E-A947-70E740481C1C}">
                 <a14:useLocalDpi xmlns:a14="http://schemas.microsoft.com/office/drawing/2010/main" val="0"/>
@@ -3958,7 +4792,7 @@
               <a:t> </a:t>
             </a:r>
             <a:r>
-              <a:rPr lang="es-ES" sz="8800" dirty="0" err="1">
+              <a:rPr lang="es-ES" sz="8800" dirty="0">
                 <a:solidFill>
                   <a:schemeClr val="accent6"/>
                 </a:solidFill>
@@ -4001,7 +4835,7 @@
           <p:nvPr/>
         </p:nvPicPr>
         <p:blipFill>
-          <a:blip r:embed="rId2">
+          <a:blip r:embed="rId3">
             <a:extLst>
               <a:ext uri="{28A0092B-C50C-407E-A947-70E740481C1C}">
                 <a14:useLocalDpi xmlns:a14="http://schemas.microsoft.com/office/drawing/2010/main" val="0"/>
@@ -4037,7 +4871,7 @@
           <p:nvPr/>
         </p:nvPicPr>
         <p:blipFill>
-          <a:blip r:embed="rId3">
+          <a:blip r:embed="rId4">
             <a:extLst>
               <a:ext uri="{28A0092B-C50C-407E-A947-70E740481C1C}">
                 <a14:useLocalDpi xmlns:a14="http://schemas.microsoft.com/office/drawing/2010/main" val="0"/>
@@ -4208,7 +5042,7 @@
           <p:nvPr/>
         </p:nvPicPr>
         <p:blipFill>
-          <a:blip r:embed="rId2"/>
+          <a:blip r:embed="rId3"/>
           <a:stretch>
             <a:fillRect/>
           </a:stretch>
@@ -4238,7 +5072,7 @@
           <p:nvPr/>
         </p:nvPicPr>
         <p:blipFill>
-          <a:blip r:embed="rId3"/>
+          <a:blip r:embed="rId4"/>
           <a:stretch>
             <a:fillRect/>
           </a:stretch>
@@ -4485,7 +5319,7 @@
           <p:nvPr/>
         </p:nvPicPr>
         <p:blipFill>
-          <a:blip r:embed="rId2"/>
+          <a:blip r:embed="rId3"/>
           <a:stretch>
             <a:fillRect/>
           </a:stretch>
@@ -4589,23 +5423,8 @@
                 </a:solidFill>
                 <a:latin typeface="Arial" panose="020B0604020202020204" pitchFamily="34" charset="0"/>
               </a:rPr>
-              <a:t>Los módulos llevan DC a los </a:t>
-            </a:r>
-            <a:r>
-              <a:rPr lang="es-ES" sz="2400" b="1" dirty="0" err="1">
-                <a:solidFill>
-                  <a:srgbClr val="002060"/>
-                </a:solidFill>
-                <a:latin typeface="Arial" panose="020B0604020202020204" pitchFamily="34" charset="0"/>
-              </a:rPr>
-              <a:t>inverters</a:t>
-            </a:r>
-            <a:endParaRPr lang="es-ES" sz="2400" b="1" dirty="0">
-              <a:solidFill>
-                <a:srgbClr val="002060"/>
-              </a:solidFill>
-              <a:latin typeface="Arial" panose="020B0604020202020204" pitchFamily="34" charset="0"/>
-            </a:endParaRPr>
+              <a:t>Los módulos llevan DC a los inverters</a:t>
+            </a:r>
           </a:p>
         </p:txBody>
       </p:sp>
@@ -4679,7 +5498,7 @@
           <p:nvPr/>
         </p:nvPicPr>
         <p:blipFill>
-          <a:blip r:embed="rId2"/>
+          <a:blip r:embed="rId3"/>
           <a:stretch>
             <a:fillRect/>
           </a:stretch>
@@ -4783,25 +5602,7 @@
                 </a:solidFill>
                 <a:latin typeface="Arial" panose="020B0604020202020204" pitchFamily="34" charset="0"/>
               </a:rPr>
-              <a:t>Los módulos llevan muy poca DC a los </a:t>
-            </a:r>
-            <a:r>
-              <a:rPr lang="es-ES" sz="2400" b="1" dirty="0" err="1">
-                <a:solidFill>
-                  <a:srgbClr val="002060"/>
-                </a:solidFill>
-                <a:latin typeface="Arial" panose="020B0604020202020204" pitchFamily="34" charset="0"/>
-              </a:rPr>
-              <a:t>inverters</a:t>
-            </a:r>
-            <a:r>
-              <a:rPr lang="es-ES" sz="2400" b="1" dirty="0">
-                <a:solidFill>
-                  <a:srgbClr val="002060"/>
-                </a:solidFill>
-                <a:latin typeface="Arial" panose="020B0604020202020204" pitchFamily="34" charset="0"/>
-              </a:rPr>
-              <a:t>, incluso en las horas de mayor irradiación</a:t>
+              <a:t>Los módulos llevan muy poca DC a los inverters, incluso en las horas de mayor irradiación</a:t>
             </a:r>
           </a:p>
         </p:txBody>
@@ -4821,7 +5622,7 @@
           <p:nvPr/>
         </p:nvPicPr>
         <p:blipFill>
-          <a:blip r:embed="rId2"/>
+          <a:blip r:embed="rId3"/>
           <a:stretch>
             <a:fillRect/>
           </a:stretch>
@@ -4908,25 +5709,7 @@
                 </a:solidFill>
                 <a:latin typeface="Arial" panose="020B0604020202020204" pitchFamily="34" charset="0"/>
               </a:rPr>
-              <a:t>Los </a:t>
-            </a:r>
-            <a:r>
-              <a:rPr lang="es-ES" sz="2400" b="1" dirty="0" err="1">
-                <a:solidFill>
-                  <a:srgbClr val="002060"/>
-                </a:solidFill>
-                <a:latin typeface="Arial" panose="020B0604020202020204" pitchFamily="34" charset="0"/>
-              </a:rPr>
-              <a:t>inverters</a:t>
-            </a:r>
-            <a:r>
-              <a:rPr lang="es-ES" sz="2400" b="1" dirty="0">
-                <a:solidFill>
-                  <a:srgbClr val="002060"/>
-                </a:solidFill>
-                <a:latin typeface="Arial" panose="020B0604020202020204" pitchFamily="34" charset="0"/>
-              </a:rPr>
-              <a:t> de la planta 1 presentan un mal funcionamiento</a:t>
+              <a:t>Los inverters de la planta 1 presentan un mal funcionamiento</a:t>
             </a:r>
             <a:br>
               <a:rPr lang="es-ES" sz="2400" b="1" dirty="0">
@@ -4937,22 +5720,13 @@
               </a:rPr>
             </a:br>
             <a:r>
-              <a:rPr lang="es-ES" sz="2400" b="1" dirty="0" err="1">
-                <a:solidFill>
-                  <a:srgbClr val="002060"/>
-                </a:solidFill>
-                <a:latin typeface="Arial" panose="020B0604020202020204" pitchFamily="34" charset="0"/>
-              </a:rPr>
-              <a:t>Unicamente</a:t>
-            </a:r>
-            <a:r>
               <a:rPr lang="es-ES" sz="2400" b="1" dirty="0">
                 <a:solidFill>
                   <a:srgbClr val="002060"/>
                 </a:solidFill>
                 <a:latin typeface="Arial" panose="020B0604020202020204" pitchFamily="34" charset="0"/>
               </a:rPr>
-              <a:t> consiguen transformar un 10% de DC en AC</a:t>
+              <a:t>Únicamente consiguen transformar un 10% de DC en AC</a:t>
             </a:r>
           </a:p>
         </p:txBody>
@@ -4972,7 +5746,7 @@
           <p:nvPr/>
         </p:nvPicPr>
         <p:blipFill>
-          <a:blip r:embed="rId2"/>
+          <a:blip r:embed="rId3"/>
           <a:stretch>
             <a:fillRect/>
           </a:stretch>
@@ -5059,25 +5833,7 @@
                 </a:solidFill>
                 <a:latin typeface="Arial" panose="020B0604020202020204" pitchFamily="34" charset="0"/>
               </a:rPr>
-              <a:t>Rendimiento </a:t>
-            </a:r>
-            <a:r>
-              <a:rPr lang="es-ES" sz="2400" b="1" dirty="0" err="1">
-                <a:solidFill>
-                  <a:srgbClr val="002060"/>
-                </a:solidFill>
-                <a:latin typeface="Arial" panose="020B0604020202020204" pitchFamily="34" charset="0"/>
-              </a:rPr>
-              <a:t>inverters</a:t>
-            </a:r>
-            <a:r>
-              <a:rPr lang="es-ES" sz="2400" b="1" dirty="0">
-                <a:solidFill>
-                  <a:srgbClr val="002060"/>
-                </a:solidFill>
-                <a:latin typeface="Arial" panose="020B0604020202020204" pitchFamily="34" charset="0"/>
-              </a:rPr>
-              <a:t> de la planta 1</a:t>
+              <a:t>Rendimiento inverters de la planta 1</a:t>
             </a:r>
           </a:p>
         </p:txBody>
@@ -5132,43 +5888,7 @@
                 </a:solidFill>
                 <a:latin typeface="Arial" panose="020B0604020202020204" pitchFamily="34" charset="0"/>
               </a:rPr>
-              <a:t>Se recomienda tareas de mantenimiento en los </a:t>
-            </a:r>
-            <a:r>
-              <a:rPr lang="es-ES" sz="1800" dirty="0" err="1">
-                <a:solidFill>
-                  <a:srgbClr val="002060"/>
-                </a:solidFill>
-                <a:latin typeface="Arial" panose="020B0604020202020204" pitchFamily="34" charset="0"/>
-              </a:rPr>
-              <a:t>inverters</a:t>
-            </a:r>
-            <a:r>
-              <a:rPr lang="es-ES" sz="1800" dirty="0">
-                <a:solidFill>
-                  <a:srgbClr val="002060"/>
-                </a:solidFill>
-                <a:latin typeface="Arial" panose="020B0604020202020204" pitchFamily="34" charset="0"/>
-              </a:rPr>
-              <a:t> con </a:t>
-            </a:r>
-            <a:r>
-              <a:rPr lang="es-ES" sz="1800" dirty="0" err="1">
-                <a:solidFill>
-                  <a:srgbClr val="002060"/>
-                </a:solidFill>
-                <a:latin typeface="Arial" panose="020B0604020202020204" pitchFamily="34" charset="0"/>
-              </a:rPr>
-              <a:t>kw_dc</a:t>
-            </a:r>
-            <a:r>
-              <a:rPr lang="es-ES" sz="1800" dirty="0">
-                <a:solidFill>
-                  <a:srgbClr val="002060"/>
-                </a:solidFill>
-                <a:latin typeface="Arial" panose="020B0604020202020204" pitchFamily="34" charset="0"/>
-              </a:rPr>
-              <a:t> &lt;= 0,01</a:t>
+              <a:t>Se recomienda tareas de mantenimiento en los inverters con kw_dc &lt;= 0,01</a:t>
             </a:r>
           </a:p>
         </p:txBody>
@@ -5188,7 +5908,7 @@
           <p:nvPr/>
         </p:nvPicPr>
         <p:blipFill>
-          <a:blip r:embed="rId2"/>
+          <a:blip r:embed="rId3"/>
           <a:stretch>
             <a:fillRect/>
           </a:stretch>
@@ -5292,25 +6012,7 @@
                 </a:solidFill>
                 <a:latin typeface="Arial" panose="020B0604020202020204" pitchFamily="34" charset="0"/>
               </a:rPr>
-              <a:t>Los </a:t>
-            </a:r>
-            <a:r>
-              <a:rPr lang="es-ES" sz="2400" b="1" dirty="0" err="1">
-                <a:solidFill>
-                  <a:srgbClr val="002060"/>
-                </a:solidFill>
-                <a:latin typeface="Arial" panose="020B0604020202020204" pitchFamily="34" charset="0"/>
-              </a:rPr>
-              <a:t>inverters</a:t>
-            </a:r>
-            <a:r>
-              <a:rPr lang="es-ES" sz="2400" b="1" dirty="0">
-                <a:solidFill>
-                  <a:srgbClr val="002060"/>
-                </a:solidFill>
-                <a:latin typeface="Arial" panose="020B0604020202020204" pitchFamily="34" charset="0"/>
-              </a:rPr>
-              <a:t> consiguen una eficiencia superior al 97%</a:t>
+              <a:t>Los inverters consiguen una eficiencia superior al 97%</a:t>
             </a:r>
           </a:p>
         </p:txBody>
@@ -5385,7 +6087,7 @@
           <p:nvPr/>
         </p:nvPicPr>
         <p:blipFill>
-          <a:blip r:embed="rId2"/>
+          <a:blip r:embed="rId3"/>
           <a:stretch>
             <a:fillRect/>
           </a:stretch>
@@ -5491,10 +6193,10 @@
           <p:nvPr/>
         </p:nvPicPr>
         <p:blipFill>
-          <a:blip r:embed="rId2">
+          <a:blip r:embed="rId3">
             <a:extLst>
               <a:ext uri="{96DAC541-7B7A-43D3-8B79-37D633B846F1}">
-                <asvg:svgBlip xmlns:asvg="http://schemas.microsoft.com/office/drawing/2016/SVG/main" r:embed="rId3"/>
+                <asvg:svgBlip xmlns:asvg="http://schemas.microsoft.com/office/drawing/2016/SVG/main" r:embed="rId4"/>
               </a:ext>
             </a:extLst>
           </a:blip>
@@ -5644,7 +6346,7 @@
           <p:nvPr/>
         </p:nvPicPr>
         <p:blipFill>
-          <a:blip r:embed="rId4">
+          <a:blip r:embed="rId5">
             <a:extLst>
               <a:ext uri="{28A0092B-C50C-407E-A947-70E740481C1C}">
                 <a14:useLocalDpi xmlns:a14="http://schemas.microsoft.com/office/drawing/2010/main" val="0"/>
@@ -5680,7 +6382,7 @@
           <p:nvPr/>
         </p:nvPicPr>
         <p:blipFill>
-          <a:blip r:embed="rId4">
+          <a:blip r:embed="rId5">
             <a:extLst>
               <a:ext uri="{28A0092B-C50C-407E-A947-70E740481C1C}">
                 <a14:useLocalDpi xmlns:a14="http://schemas.microsoft.com/office/drawing/2010/main" val="0"/>
@@ -5716,7 +6418,7 @@
           <p:nvPr/>
         </p:nvPicPr>
         <p:blipFill>
-          <a:blip r:embed="rId4">
+          <a:blip r:embed="rId5">
             <a:extLst>
               <a:ext uri="{28A0092B-C50C-407E-A947-70E740481C1C}">
                 <a14:useLocalDpi xmlns:a14="http://schemas.microsoft.com/office/drawing/2010/main" val="0"/>
@@ -5791,10 +6493,10 @@
           <p:nvPr/>
         </p:nvPicPr>
         <p:blipFill>
-          <a:blip r:embed="rId2">
+          <a:blip r:embed="rId3">
             <a:extLst>
               <a:ext uri="{96DAC541-7B7A-43D3-8B79-37D633B846F1}">
-                <asvg:svgBlip xmlns:asvg="http://schemas.microsoft.com/office/drawing/2016/SVG/main" r:embed="rId3"/>
+                <asvg:svgBlip xmlns:asvg="http://schemas.microsoft.com/office/drawing/2016/SVG/main" r:embed="rId4"/>
               </a:ext>
             </a:extLst>
           </a:blip>
@@ -5866,10 +6568,10 @@
           <p:nvPr/>
         </p:nvPicPr>
         <p:blipFill>
-          <a:blip r:embed="rId2">
+          <a:blip r:embed="rId3">
             <a:extLst>
               <a:ext uri="{96DAC541-7B7A-43D3-8B79-37D633B846F1}">
-                <asvg:svgBlip xmlns:asvg="http://schemas.microsoft.com/office/drawing/2016/SVG/main" r:embed="rId3"/>
+                <asvg:svgBlip xmlns:asvg="http://schemas.microsoft.com/office/drawing/2016/SVG/main" r:embed="rId4"/>
               </a:ext>
             </a:extLst>
           </a:blip>
@@ -5902,7 +6604,7 @@
           <p:nvPr/>
         </p:nvPicPr>
         <p:blipFill>
-          <a:blip r:embed="rId4">
+          <a:blip r:embed="rId5">
             <a:extLst>
               <a:ext uri="{28A0092B-C50C-407E-A947-70E740481C1C}">
                 <a14:useLocalDpi xmlns:a14="http://schemas.microsoft.com/office/drawing/2010/main" val="0"/>
@@ -5957,21 +6659,8 @@
                   <a:srgbClr val="002060"/>
                 </a:solidFill>
               </a:rPr>
-              <a:t>Eficiencia </a:t>
-            </a:r>
-            <a:r>
-              <a:rPr lang="es-ES" dirty="0" err="1">
-                <a:solidFill>
-                  <a:srgbClr val="002060"/>
-                </a:solidFill>
-              </a:rPr>
-              <a:t>inverters</a:t>
-            </a:r>
-            <a:endParaRPr lang="es-ES" dirty="0">
-              <a:solidFill>
-                <a:srgbClr val="002060"/>
-              </a:solidFill>
-            </a:endParaRPr>
+              <a:t>Eficiencia inverters</a:t>
+            </a:r>
           </a:p>
         </p:txBody>
       </p:sp>
@@ -5990,10 +6679,10 @@
           <p:nvPr/>
         </p:nvPicPr>
         <p:blipFill>
-          <a:blip r:embed="rId2">
+          <a:blip r:embed="rId3">
             <a:extLst>
               <a:ext uri="{96DAC541-7B7A-43D3-8B79-37D633B846F1}">
-                <asvg:svgBlip xmlns:asvg="http://schemas.microsoft.com/office/drawing/2016/SVG/main" r:embed="rId3"/>
+                <asvg:svgBlip xmlns:asvg="http://schemas.microsoft.com/office/drawing/2016/SVG/main" r:embed="rId4"/>
               </a:ext>
             </a:extLst>
           </a:blip>
@@ -6139,23 +6828,7 @@
                   <a:srgbClr val="002060"/>
                 </a:solidFill>
               </a:rPr>
-              <a:t>Revisión de los módulos de los </a:t>
-            </a:r>
-            <a:r>
-              <a:rPr lang="es-ES" dirty="0" err="1">
-                <a:solidFill>
-                  <a:srgbClr val="002060"/>
-                </a:solidFill>
-              </a:rPr>
-              <a:t>inverters</a:t>
-            </a:r>
-            <a:r>
-              <a:rPr lang="es-ES" dirty="0">
-                <a:solidFill>
-                  <a:srgbClr val="002060"/>
-                </a:solidFill>
-              </a:rPr>
-              <a:t> señalados en la planta 2.</a:t>
+              <a:t>Revisión de los módulos de los inverters señalados en la planta 2.</a:t>
             </a:r>
           </a:p>
         </p:txBody>
@@ -6202,23 +6875,7 @@
                   <a:srgbClr val="002060"/>
                 </a:solidFill>
               </a:rPr>
-              <a:t> Mantenimiento de todos los </a:t>
-            </a:r>
-            <a:r>
-              <a:rPr lang="es-ES" dirty="0" err="1">
-                <a:solidFill>
-                  <a:srgbClr val="002060"/>
-                </a:solidFill>
-              </a:rPr>
-              <a:t>inverters</a:t>
-            </a:r>
-            <a:r>
-              <a:rPr lang="es-ES" dirty="0">
-                <a:solidFill>
-                  <a:srgbClr val="002060"/>
-                </a:solidFill>
-              </a:rPr>
-              <a:t> de la planta 1.</a:t>
+              <a:t> Mantenimiento de todos los inverters de la planta 1.</a:t>
             </a:r>
           </a:p>
         </p:txBody>

</xml_diff>